<commit_message>
Phase 2 mostly working
</commit_message>
<xml_diff>
--- a/slides/template-silber.pptx
+++ b/slides/template-silber.pptx
@@ -2480,7 +2480,7 @@
 </file>
 
 <file path=ppt/slideLayouts/slideLayout4.xml><?xml version="1.0" encoding="utf-8"?>
-<p:sldLayout xmlns:a="http://schemas.openxmlformats.org/drawingml/2006/main" xmlns:r="http://schemas.openxmlformats.org/officeDocument/2006/relationships" xmlns:p="http://schemas.openxmlformats.org/presentationml/2006/main" matchingName="Two Content" type="twoObj">
+<p:sldLayout xmlns:a="http://schemas.openxmlformats.org/drawingml/2006/main" xmlns:r="http://schemas.openxmlformats.org/officeDocument/2006/relationships" xmlns:p="http://schemas.openxmlformats.org/presentationml/2006/main" matchingName="Two Content" userDrawn="1">
   <p:cSld name="TWO_OBJECTS">
     <p:bg>
       <p:bgPr>
@@ -2560,6 +2560,487 @@
       </p:sp>
       <p:sp>
         <p:nvSpPr>
+          <p:cNvPr id="75" name="Google Shape;75;p18"/>
+          <p:cNvSpPr txBox="1">
+            <a:spLocks noGrp="1"/>
+          </p:cNvSpPr>
+          <p:nvPr>
+            <p:ph type="sldNum" idx="12"/>
+          </p:nvPr>
+        </p:nvSpPr>
+        <p:spPr>
+          <a:xfrm>
+            <a:off x="3505200" y="4767263"/>
+            <a:ext cx="2133600" cy="274637"/>
+          </a:xfrm>
+          <a:prstGeom prst="rect">
+            <a:avLst/>
+          </a:prstGeom>
+          <a:noFill/>
+          <a:ln>
+            <a:noFill/>
+          </a:ln>
+        </p:spPr>
+        <p:txBody>
+          <a:bodyPr spcFirstLastPara="1" wrap="square" lIns="91425" tIns="45700" rIns="91425" bIns="45700" anchor="t" anchorCtr="0">
+            <a:noAutofit/>
+          </a:bodyPr>
+          <a:lstStyle>
+            <a:lvl1pPr marL="0" marR="0" lvl="0" indent="0" algn="ctr" rtl="0">
+              <a:spcBef>
+                <a:spcPts val="0"/>
+              </a:spcBef>
+              <a:spcAft>
+                <a:spcPts val="0"/>
+              </a:spcAft>
+              <a:buNone/>
+              <a:defRPr sz="1800">
+                <a:solidFill>
+                  <a:schemeClr val="lt1"/>
+                </a:solidFill>
+                <a:latin typeface="Arial"/>
+                <a:ea typeface="Arial"/>
+                <a:cs typeface="Arial"/>
+                <a:sym typeface="Arial"/>
+              </a:defRPr>
+            </a:lvl1pPr>
+            <a:lvl2pPr marL="0" marR="0" lvl="1" indent="0" algn="ctr" rtl="0">
+              <a:spcBef>
+                <a:spcPts val="0"/>
+              </a:spcBef>
+              <a:spcAft>
+                <a:spcPts val="0"/>
+              </a:spcAft>
+              <a:buNone/>
+              <a:defRPr sz="1800">
+                <a:solidFill>
+                  <a:schemeClr val="lt1"/>
+                </a:solidFill>
+                <a:latin typeface="Arial"/>
+                <a:ea typeface="Arial"/>
+                <a:cs typeface="Arial"/>
+                <a:sym typeface="Arial"/>
+              </a:defRPr>
+            </a:lvl2pPr>
+            <a:lvl3pPr marL="0" marR="0" lvl="2" indent="0" algn="ctr" rtl="0">
+              <a:spcBef>
+                <a:spcPts val="0"/>
+              </a:spcBef>
+              <a:spcAft>
+                <a:spcPts val="0"/>
+              </a:spcAft>
+              <a:buNone/>
+              <a:defRPr sz="1800">
+                <a:solidFill>
+                  <a:schemeClr val="lt1"/>
+                </a:solidFill>
+                <a:latin typeface="Arial"/>
+                <a:ea typeface="Arial"/>
+                <a:cs typeface="Arial"/>
+                <a:sym typeface="Arial"/>
+              </a:defRPr>
+            </a:lvl3pPr>
+            <a:lvl4pPr marL="0" marR="0" lvl="3" indent="0" algn="ctr" rtl="0">
+              <a:spcBef>
+                <a:spcPts val="0"/>
+              </a:spcBef>
+              <a:spcAft>
+                <a:spcPts val="0"/>
+              </a:spcAft>
+              <a:buNone/>
+              <a:defRPr sz="1800">
+                <a:solidFill>
+                  <a:schemeClr val="lt1"/>
+                </a:solidFill>
+                <a:latin typeface="Arial"/>
+                <a:ea typeface="Arial"/>
+                <a:cs typeface="Arial"/>
+                <a:sym typeface="Arial"/>
+              </a:defRPr>
+            </a:lvl4pPr>
+            <a:lvl5pPr marL="0" marR="0" lvl="4" indent="0" algn="ctr" rtl="0">
+              <a:spcBef>
+                <a:spcPts val="0"/>
+              </a:spcBef>
+              <a:spcAft>
+                <a:spcPts val="0"/>
+              </a:spcAft>
+              <a:buNone/>
+              <a:defRPr sz="1800">
+                <a:solidFill>
+                  <a:schemeClr val="lt1"/>
+                </a:solidFill>
+                <a:latin typeface="Arial"/>
+                <a:ea typeface="Arial"/>
+                <a:cs typeface="Arial"/>
+                <a:sym typeface="Arial"/>
+              </a:defRPr>
+            </a:lvl5pPr>
+            <a:lvl6pPr marL="0" marR="0" lvl="5" indent="0" algn="ctr" rtl="0">
+              <a:spcBef>
+                <a:spcPts val="0"/>
+              </a:spcBef>
+              <a:spcAft>
+                <a:spcPts val="0"/>
+              </a:spcAft>
+              <a:buNone/>
+              <a:defRPr sz="1800">
+                <a:solidFill>
+                  <a:schemeClr val="lt1"/>
+                </a:solidFill>
+                <a:latin typeface="Arial"/>
+                <a:ea typeface="Arial"/>
+                <a:cs typeface="Arial"/>
+                <a:sym typeface="Arial"/>
+              </a:defRPr>
+            </a:lvl6pPr>
+            <a:lvl7pPr marL="0" marR="0" lvl="6" indent="0" algn="ctr" rtl="0">
+              <a:spcBef>
+                <a:spcPts val="0"/>
+              </a:spcBef>
+              <a:spcAft>
+                <a:spcPts val="0"/>
+              </a:spcAft>
+              <a:buNone/>
+              <a:defRPr sz="1800">
+                <a:solidFill>
+                  <a:schemeClr val="lt1"/>
+                </a:solidFill>
+                <a:latin typeface="Arial"/>
+                <a:ea typeface="Arial"/>
+                <a:cs typeface="Arial"/>
+                <a:sym typeface="Arial"/>
+              </a:defRPr>
+            </a:lvl7pPr>
+            <a:lvl8pPr marL="0" marR="0" lvl="7" indent="0" algn="ctr" rtl="0">
+              <a:spcBef>
+                <a:spcPts val="0"/>
+              </a:spcBef>
+              <a:spcAft>
+                <a:spcPts val="0"/>
+              </a:spcAft>
+              <a:buNone/>
+              <a:defRPr sz="1800">
+                <a:solidFill>
+                  <a:schemeClr val="lt1"/>
+                </a:solidFill>
+                <a:latin typeface="Arial"/>
+                <a:ea typeface="Arial"/>
+                <a:cs typeface="Arial"/>
+                <a:sym typeface="Arial"/>
+              </a:defRPr>
+            </a:lvl8pPr>
+            <a:lvl9pPr marL="0" marR="0" lvl="8" indent="0" algn="ctr" rtl="0">
+              <a:spcBef>
+                <a:spcPts val="0"/>
+              </a:spcBef>
+              <a:spcAft>
+                <a:spcPts val="0"/>
+              </a:spcAft>
+              <a:buNone/>
+              <a:defRPr sz="1800">
+                <a:solidFill>
+                  <a:schemeClr val="lt1"/>
+                </a:solidFill>
+                <a:latin typeface="Arial"/>
+                <a:ea typeface="Arial"/>
+                <a:cs typeface="Arial"/>
+                <a:sym typeface="Arial"/>
+              </a:defRPr>
+            </a:lvl9pPr>
+          </a:lstStyle>
+          <a:p>
+            <a:pPr marL="0" lvl="0" indent="0" algn="ctr" rtl="0">
+              <a:spcBef>
+                <a:spcPts val="0"/>
+              </a:spcBef>
+              <a:spcAft>
+                <a:spcPts val="0"/>
+              </a:spcAft>
+              <a:buNone/>
+            </a:pPr>
+            <a:fld id="{00000000-1234-1234-1234-123412341234}" type="slidenum">
+              <a:rPr lang="en"/>
+              <a:t>‹#›</a:t>
+            </a:fld>
+            <a:endParaRPr/>
+          </a:p>
+        </p:txBody>
+      </p:sp>
+      <p:sp>
+        <p:nvSpPr>
+          <p:cNvPr id="76" name="Google Shape;76;p18"/>
+          <p:cNvSpPr txBox="1"/>
+          <p:nvPr/>
+        </p:nvSpPr>
+        <p:spPr>
+          <a:xfrm>
+            <a:off x="5678902" y="4476750"/>
+            <a:ext cx="2550698" cy="738664"/>
+          </a:xfrm>
+          <a:prstGeom prst="rect">
+            <a:avLst/>
+          </a:prstGeom>
+          <a:noFill/>
+          <a:ln>
+            <a:noFill/>
+          </a:ln>
+        </p:spPr>
+        <p:txBody>
+          <a:bodyPr spcFirstLastPara="1" wrap="square" lIns="91425" tIns="45700" rIns="91425" bIns="45700" anchor="t" anchorCtr="0">
+            <a:spAutoFit/>
+          </a:bodyPr>
+          <a:lstStyle/>
+          <a:p>
+            <a:pPr marL="0" marR="0" lvl="0" indent="0" algn="l" rtl="0">
+              <a:spcBef>
+                <a:spcPts val="0"/>
+              </a:spcBef>
+              <a:spcAft>
+                <a:spcPts val="0"/>
+              </a:spcAft>
+              <a:buNone/>
+            </a:pPr>
+            <a:r>
+              <a:rPr lang="en" sz="1400" dirty="0">
+                <a:solidFill>
+                  <a:schemeClr val="lt1"/>
+                </a:solidFill>
+                <a:latin typeface="Arial"/>
+                <a:ea typeface="Arial"/>
+                <a:cs typeface="Arial"/>
+                <a:sym typeface="Arial"/>
+              </a:rPr>
+              <a:t>Greg Silber and Cory Bart</a:t>
+            </a:r>
+            <a:endParaRPr dirty="0"/>
+          </a:p>
+          <a:p>
+            <a:pPr marL="0" marR="0" lvl="0" indent="0" algn="l" rtl="0">
+              <a:spcBef>
+                <a:spcPts val="0"/>
+              </a:spcBef>
+              <a:spcAft>
+                <a:spcPts val="0"/>
+              </a:spcAft>
+              <a:buNone/>
+            </a:pPr>
+            <a:r>
+              <a:rPr lang="en" sz="1400" dirty="0">
+                <a:solidFill>
+                  <a:schemeClr val="lt1"/>
+                </a:solidFill>
+                <a:latin typeface="Arial"/>
+                <a:ea typeface="Arial"/>
+                <a:cs typeface="Arial"/>
+                <a:sym typeface="Arial"/>
+              </a:rPr>
+              <a:t>Department of Computer and </a:t>
+            </a:r>
+            <a:br>
+              <a:rPr lang="en" sz="1400" dirty="0">
+                <a:solidFill>
+                  <a:schemeClr val="lt1"/>
+                </a:solidFill>
+                <a:latin typeface="Arial"/>
+                <a:ea typeface="Arial"/>
+                <a:cs typeface="Arial"/>
+                <a:sym typeface="Arial"/>
+              </a:rPr>
+            </a:br>
+            <a:r>
+              <a:rPr lang="en" sz="1400" dirty="0">
+                <a:solidFill>
+                  <a:schemeClr val="lt1"/>
+                </a:solidFill>
+                <a:latin typeface="Arial"/>
+                <a:ea typeface="Arial"/>
+                <a:cs typeface="Arial"/>
+                <a:sym typeface="Arial"/>
+              </a:rPr>
+              <a:t>Information Sciences</a:t>
+            </a:r>
+            <a:endParaRPr dirty="0"/>
+          </a:p>
+        </p:txBody>
+      </p:sp>
+      <p:sp>
+        <p:nvSpPr>
+          <p:cNvPr id="3" name="Google Shape;73;p18">
+            <a:extLst>
+              <a:ext uri="{FF2B5EF4-FFF2-40B4-BE49-F238E27FC236}">
+                <a16:creationId xmlns:a16="http://schemas.microsoft.com/office/drawing/2014/main" id="{F9669722-8125-D05D-D86E-67C6EAD8AAB7}"/>
+              </a:ext>
+            </a:extLst>
+          </p:cNvPr>
+          <p:cNvSpPr txBox="1">
+            <a:spLocks noGrp="1"/>
+          </p:cNvSpPr>
+          <p:nvPr>
+            <p:ph type="body" idx="13"/>
+          </p:nvPr>
+        </p:nvSpPr>
+        <p:spPr>
+          <a:xfrm>
+            <a:off x="1941059" y="539884"/>
+            <a:ext cx="5044258" cy="600739"/>
+          </a:xfrm>
+          <a:prstGeom prst="rect">
+            <a:avLst/>
+          </a:prstGeom>
+          <a:noFill/>
+          <a:ln>
+            <a:noFill/>
+          </a:ln>
+        </p:spPr>
+        <p:txBody>
+          <a:bodyPr spcFirstLastPara="1" wrap="square" lIns="91425" tIns="45700" rIns="91425" bIns="45700" anchor="t" anchorCtr="0">
+            <a:noAutofit/>
+          </a:bodyPr>
+          <a:lstStyle>
+            <a:lvl1pPr marL="50800" lvl="0" indent="0" algn="l">
+              <a:spcBef>
+                <a:spcPts val="560"/>
+              </a:spcBef>
+              <a:spcAft>
+                <a:spcPts val="0"/>
+              </a:spcAft>
+              <a:buClr>
+                <a:srgbClr val="006096"/>
+              </a:buClr>
+              <a:buSzPts val="2800"/>
+              <a:buFont typeface="Arial" panose="020B0604020202020204" pitchFamily="34" charset="0"/>
+              <a:buNone/>
+              <a:defRPr lang="en-US" sz="1200" b="0" i="0" u="none" strike="noStrike" cap="none" dirty="0" smtClean="0">
+                <a:solidFill>
+                  <a:schemeClr val="bg1"/>
+                </a:solidFill>
+                <a:latin typeface="Calibri"/>
+                <a:ea typeface="Calibri"/>
+                <a:cs typeface="Calibri"/>
+                <a:sym typeface="Calibri"/>
+              </a:defRPr>
+            </a:lvl1pPr>
+            <a:lvl2pPr marL="914400" lvl="1" indent="-381000" algn="l">
+              <a:spcBef>
+                <a:spcPts val="480"/>
+              </a:spcBef>
+              <a:spcAft>
+                <a:spcPts val="0"/>
+              </a:spcAft>
+              <a:buClr>
+                <a:schemeClr val="lt1"/>
+              </a:buClr>
+              <a:buSzPts val="2400"/>
+              <a:buChar char="–"/>
+              <a:defRPr sz="2400"/>
+            </a:lvl2pPr>
+            <a:lvl3pPr marL="1371600" lvl="2" indent="-355600" algn="l">
+              <a:spcBef>
+                <a:spcPts val="400"/>
+              </a:spcBef>
+              <a:spcAft>
+                <a:spcPts val="0"/>
+              </a:spcAft>
+              <a:buClr>
+                <a:schemeClr val="lt1"/>
+              </a:buClr>
+              <a:buSzPts val="2000"/>
+              <a:buChar char="•"/>
+              <a:defRPr sz="2000"/>
+            </a:lvl3pPr>
+            <a:lvl4pPr marL="1828800" lvl="3" indent="-342900" algn="l">
+              <a:spcBef>
+                <a:spcPts val="360"/>
+              </a:spcBef>
+              <a:spcAft>
+                <a:spcPts val="0"/>
+              </a:spcAft>
+              <a:buClr>
+                <a:schemeClr val="lt1"/>
+              </a:buClr>
+              <a:buSzPts val="1800"/>
+              <a:buChar char="–"/>
+              <a:defRPr sz="1800"/>
+            </a:lvl4pPr>
+            <a:lvl5pPr marL="2286000" lvl="4" indent="-342900" algn="l">
+              <a:spcBef>
+                <a:spcPts val="360"/>
+              </a:spcBef>
+              <a:spcAft>
+                <a:spcPts val="0"/>
+              </a:spcAft>
+              <a:buClr>
+                <a:schemeClr val="lt1"/>
+              </a:buClr>
+              <a:buSzPts val="1800"/>
+              <a:buChar char="»"/>
+              <a:defRPr sz="1800"/>
+            </a:lvl5pPr>
+            <a:lvl6pPr marL="2743200" lvl="5" indent="-342900" algn="l">
+              <a:spcBef>
+                <a:spcPts val="360"/>
+              </a:spcBef>
+              <a:spcAft>
+                <a:spcPts val="0"/>
+              </a:spcAft>
+              <a:buClr>
+                <a:schemeClr val="dk1"/>
+              </a:buClr>
+              <a:buSzPts val="1800"/>
+              <a:buChar char="•"/>
+              <a:defRPr sz="1800"/>
+            </a:lvl6pPr>
+            <a:lvl7pPr marL="3200400" lvl="6" indent="-342900" algn="l">
+              <a:spcBef>
+                <a:spcPts val="360"/>
+              </a:spcBef>
+              <a:spcAft>
+                <a:spcPts val="0"/>
+              </a:spcAft>
+              <a:buClr>
+                <a:schemeClr val="dk1"/>
+              </a:buClr>
+              <a:buSzPts val="1800"/>
+              <a:buChar char="•"/>
+              <a:defRPr sz="1800"/>
+            </a:lvl7pPr>
+            <a:lvl8pPr marL="3657600" lvl="7" indent="-342900" algn="l">
+              <a:spcBef>
+                <a:spcPts val="360"/>
+              </a:spcBef>
+              <a:spcAft>
+                <a:spcPts val="0"/>
+              </a:spcAft>
+              <a:buClr>
+                <a:schemeClr val="dk1"/>
+              </a:buClr>
+              <a:buSzPts val="1800"/>
+              <a:buChar char="•"/>
+              <a:defRPr sz="1800"/>
+            </a:lvl8pPr>
+            <a:lvl9pPr marL="4114800" lvl="8" indent="-342900" algn="l">
+              <a:spcBef>
+                <a:spcPts val="360"/>
+              </a:spcBef>
+              <a:spcAft>
+                <a:spcPts val="0"/>
+              </a:spcAft>
+              <a:buClr>
+                <a:schemeClr val="dk1"/>
+              </a:buClr>
+              <a:buSzPts val="1800"/>
+              <a:buChar char="•"/>
+              <a:defRPr sz="1800"/>
+            </a:lvl9pPr>
+          </a:lstStyle>
+          <a:p>
+            <a:endParaRPr lang="en-US" dirty="0"/>
+          </a:p>
+        </p:txBody>
+      </p:sp>
+      <p:sp>
+        <p:nvSpPr>
           <p:cNvPr id="73" name="Google Shape;73;p18"/>
           <p:cNvSpPr txBox="1">
             <a:spLocks noGrp="1"/>
@@ -2601,7 +3082,7 @@
               <a:buChar char="•"/>
               <a:defRPr lang="en-US" sz="1600" b="0" i="0" u="none" strike="noStrike" cap="none" dirty="0" smtClean="0">
                 <a:solidFill>
-                  <a:srgbClr val="006096"/>
+                  <a:schemeClr val="bg2"/>
                 </a:solidFill>
                 <a:latin typeface="Calibri"/>
                 <a:ea typeface="Calibri"/>
@@ -2769,7 +3250,7 @@
               <a:buChar char="•"/>
               <a:defRPr sz="1600" b="0" i="0" u="none" strike="noStrike" cap="none" dirty="0">
                 <a:solidFill>
-                  <a:srgbClr val="006096"/>
+                  <a:schemeClr val="bg2"/>
                 </a:solidFill>
                 <a:latin typeface="Calibri"/>
                 <a:ea typeface="Calibri"/>
@@ -2891,312 +3372,6 @@
             </a:lvl9pPr>
           </a:lstStyle>
           <a:p>
-            <a:endParaRPr dirty="0"/>
-          </a:p>
-        </p:txBody>
-      </p:sp>
-      <p:sp>
-        <p:nvSpPr>
-          <p:cNvPr id="75" name="Google Shape;75;p18"/>
-          <p:cNvSpPr txBox="1">
-            <a:spLocks noGrp="1"/>
-          </p:cNvSpPr>
-          <p:nvPr>
-            <p:ph type="sldNum" idx="12"/>
-          </p:nvPr>
-        </p:nvSpPr>
-        <p:spPr>
-          <a:xfrm>
-            <a:off x="3505200" y="4767263"/>
-            <a:ext cx="2133600" cy="274637"/>
-          </a:xfrm>
-          <a:prstGeom prst="rect">
-            <a:avLst/>
-          </a:prstGeom>
-          <a:noFill/>
-          <a:ln>
-            <a:noFill/>
-          </a:ln>
-        </p:spPr>
-        <p:txBody>
-          <a:bodyPr spcFirstLastPara="1" wrap="square" lIns="91425" tIns="45700" rIns="91425" bIns="45700" anchor="t" anchorCtr="0">
-            <a:noAutofit/>
-          </a:bodyPr>
-          <a:lstStyle>
-            <a:lvl1pPr marL="0" marR="0" lvl="0" indent="0" algn="ctr" rtl="0">
-              <a:spcBef>
-                <a:spcPts val="0"/>
-              </a:spcBef>
-              <a:spcAft>
-                <a:spcPts val="0"/>
-              </a:spcAft>
-              <a:buNone/>
-              <a:defRPr sz="1800">
-                <a:solidFill>
-                  <a:schemeClr val="lt1"/>
-                </a:solidFill>
-                <a:latin typeface="Arial"/>
-                <a:ea typeface="Arial"/>
-                <a:cs typeface="Arial"/>
-                <a:sym typeface="Arial"/>
-              </a:defRPr>
-            </a:lvl1pPr>
-            <a:lvl2pPr marL="0" marR="0" lvl="1" indent="0" algn="ctr" rtl="0">
-              <a:spcBef>
-                <a:spcPts val="0"/>
-              </a:spcBef>
-              <a:spcAft>
-                <a:spcPts val="0"/>
-              </a:spcAft>
-              <a:buNone/>
-              <a:defRPr sz="1800">
-                <a:solidFill>
-                  <a:schemeClr val="lt1"/>
-                </a:solidFill>
-                <a:latin typeface="Arial"/>
-                <a:ea typeface="Arial"/>
-                <a:cs typeface="Arial"/>
-                <a:sym typeface="Arial"/>
-              </a:defRPr>
-            </a:lvl2pPr>
-            <a:lvl3pPr marL="0" marR="0" lvl="2" indent="0" algn="ctr" rtl="0">
-              <a:spcBef>
-                <a:spcPts val="0"/>
-              </a:spcBef>
-              <a:spcAft>
-                <a:spcPts val="0"/>
-              </a:spcAft>
-              <a:buNone/>
-              <a:defRPr sz="1800">
-                <a:solidFill>
-                  <a:schemeClr val="lt1"/>
-                </a:solidFill>
-                <a:latin typeface="Arial"/>
-                <a:ea typeface="Arial"/>
-                <a:cs typeface="Arial"/>
-                <a:sym typeface="Arial"/>
-              </a:defRPr>
-            </a:lvl3pPr>
-            <a:lvl4pPr marL="0" marR="0" lvl="3" indent="0" algn="ctr" rtl="0">
-              <a:spcBef>
-                <a:spcPts val="0"/>
-              </a:spcBef>
-              <a:spcAft>
-                <a:spcPts val="0"/>
-              </a:spcAft>
-              <a:buNone/>
-              <a:defRPr sz="1800">
-                <a:solidFill>
-                  <a:schemeClr val="lt1"/>
-                </a:solidFill>
-                <a:latin typeface="Arial"/>
-                <a:ea typeface="Arial"/>
-                <a:cs typeface="Arial"/>
-                <a:sym typeface="Arial"/>
-              </a:defRPr>
-            </a:lvl4pPr>
-            <a:lvl5pPr marL="0" marR="0" lvl="4" indent="0" algn="ctr" rtl="0">
-              <a:spcBef>
-                <a:spcPts val="0"/>
-              </a:spcBef>
-              <a:spcAft>
-                <a:spcPts val="0"/>
-              </a:spcAft>
-              <a:buNone/>
-              <a:defRPr sz="1800">
-                <a:solidFill>
-                  <a:schemeClr val="lt1"/>
-                </a:solidFill>
-                <a:latin typeface="Arial"/>
-                <a:ea typeface="Arial"/>
-                <a:cs typeface="Arial"/>
-                <a:sym typeface="Arial"/>
-              </a:defRPr>
-            </a:lvl5pPr>
-            <a:lvl6pPr marL="0" marR="0" lvl="5" indent="0" algn="ctr" rtl="0">
-              <a:spcBef>
-                <a:spcPts val="0"/>
-              </a:spcBef>
-              <a:spcAft>
-                <a:spcPts val="0"/>
-              </a:spcAft>
-              <a:buNone/>
-              <a:defRPr sz="1800">
-                <a:solidFill>
-                  <a:schemeClr val="lt1"/>
-                </a:solidFill>
-                <a:latin typeface="Arial"/>
-                <a:ea typeface="Arial"/>
-                <a:cs typeface="Arial"/>
-                <a:sym typeface="Arial"/>
-              </a:defRPr>
-            </a:lvl6pPr>
-            <a:lvl7pPr marL="0" marR="0" lvl="6" indent="0" algn="ctr" rtl="0">
-              <a:spcBef>
-                <a:spcPts val="0"/>
-              </a:spcBef>
-              <a:spcAft>
-                <a:spcPts val="0"/>
-              </a:spcAft>
-              <a:buNone/>
-              <a:defRPr sz="1800">
-                <a:solidFill>
-                  <a:schemeClr val="lt1"/>
-                </a:solidFill>
-                <a:latin typeface="Arial"/>
-                <a:ea typeface="Arial"/>
-                <a:cs typeface="Arial"/>
-                <a:sym typeface="Arial"/>
-              </a:defRPr>
-            </a:lvl7pPr>
-            <a:lvl8pPr marL="0" marR="0" lvl="7" indent="0" algn="ctr" rtl="0">
-              <a:spcBef>
-                <a:spcPts val="0"/>
-              </a:spcBef>
-              <a:spcAft>
-                <a:spcPts val="0"/>
-              </a:spcAft>
-              <a:buNone/>
-              <a:defRPr sz="1800">
-                <a:solidFill>
-                  <a:schemeClr val="lt1"/>
-                </a:solidFill>
-                <a:latin typeface="Arial"/>
-                <a:ea typeface="Arial"/>
-                <a:cs typeface="Arial"/>
-                <a:sym typeface="Arial"/>
-              </a:defRPr>
-            </a:lvl8pPr>
-            <a:lvl9pPr marL="0" marR="0" lvl="8" indent="0" algn="ctr" rtl="0">
-              <a:spcBef>
-                <a:spcPts val="0"/>
-              </a:spcBef>
-              <a:spcAft>
-                <a:spcPts val="0"/>
-              </a:spcAft>
-              <a:buNone/>
-              <a:defRPr sz="1800">
-                <a:solidFill>
-                  <a:schemeClr val="lt1"/>
-                </a:solidFill>
-                <a:latin typeface="Arial"/>
-                <a:ea typeface="Arial"/>
-                <a:cs typeface="Arial"/>
-                <a:sym typeface="Arial"/>
-              </a:defRPr>
-            </a:lvl9pPr>
-          </a:lstStyle>
-          <a:p>
-            <a:pPr marL="0" lvl="0" indent="0" algn="ctr" rtl="0">
-              <a:spcBef>
-                <a:spcPts val="0"/>
-              </a:spcBef>
-              <a:spcAft>
-                <a:spcPts val="0"/>
-              </a:spcAft>
-              <a:buNone/>
-            </a:pPr>
-            <a:fld id="{00000000-1234-1234-1234-123412341234}" type="slidenum">
-              <a:rPr lang="en"/>
-              <a:t>‹#›</a:t>
-            </a:fld>
-            <a:endParaRPr/>
-          </a:p>
-        </p:txBody>
-      </p:sp>
-      <p:sp>
-        <p:nvSpPr>
-          <p:cNvPr id="76" name="Google Shape;76;p18"/>
-          <p:cNvSpPr txBox="1"/>
-          <p:nvPr/>
-        </p:nvSpPr>
-        <p:spPr>
-          <a:xfrm>
-            <a:off x="5678902" y="4476750"/>
-            <a:ext cx="2550698" cy="738664"/>
-          </a:xfrm>
-          <a:prstGeom prst="rect">
-            <a:avLst/>
-          </a:prstGeom>
-          <a:noFill/>
-          <a:ln>
-            <a:noFill/>
-          </a:ln>
-        </p:spPr>
-        <p:txBody>
-          <a:bodyPr spcFirstLastPara="1" wrap="square" lIns="91425" tIns="45700" rIns="91425" bIns="45700" anchor="t" anchorCtr="0">
-            <a:spAutoFit/>
-          </a:bodyPr>
-          <a:lstStyle/>
-          <a:p>
-            <a:pPr marL="0" marR="0" lvl="0" indent="0" algn="l" rtl="0">
-              <a:spcBef>
-                <a:spcPts val="0"/>
-              </a:spcBef>
-              <a:spcAft>
-                <a:spcPts val="0"/>
-              </a:spcAft>
-              <a:buNone/>
-            </a:pPr>
-            <a:r>
-              <a:rPr lang="en" sz="1400" dirty="0">
-                <a:solidFill>
-                  <a:schemeClr val="lt1"/>
-                </a:solidFill>
-                <a:latin typeface="Arial"/>
-                <a:ea typeface="Arial"/>
-                <a:cs typeface="Arial"/>
-                <a:sym typeface="Arial"/>
-              </a:rPr>
-              <a:t>Greg Silber and Cory Bart</a:t>
-            </a:r>
-            <a:endParaRPr dirty="0"/>
-          </a:p>
-          <a:p>
-            <a:pPr marL="0" marR="0" lvl="0" indent="0" algn="l" rtl="0">
-              <a:spcBef>
-                <a:spcPts val="0"/>
-              </a:spcBef>
-              <a:spcAft>
-                <a:spcPts val="0"/>
-              </a:spcAft>
-              <a:buNone/>
-            </a:pPr>
-            <a:r>
-              <a:rPr lang="en" sz="1400" dirty="0">
-                <a:solidFill>
-                  <a:schemeClr val="lt1"/>
-                </a:solidFill>
-                <a:latin typeface="Arial"/>
-                <a:ea typeface="Arial"/>
-                <a:cs typeface="Arial"/>
-                <a:sym typeface="Arial"/>
-              </a:rPr>
-              <a:t>Department of Computer and </a:t>
-            </a:r>
-            <a:br>
-              <a:rPr lang="en" sz="1400" dirty="0">
-                <a:solidFill>
-                  <a:schemeClr val="lt1"/>
-                </a:solidFill>
-                <a:latin typeface="Arial"/>
-                <a:ea typeface="Arial"/>
-                <a:cs typeface="Arial"/>
-                <a:sym typeface="Arial"/>
-              </a:rPr>
-            </a:br>
-            <a:r>
-              <a:rPr lang="en" sz="1400" dirty="0">
-                <a:solidFill>
-                  <a:schemeClr val="lt1"/>
-                </a:solidFill>
-                <a:latin typeface="Arial"/>
-                <a:ea typeface="Arial"/>
-                <a:cs typeface="Arial"/>
-                <a:sym typeface="Arial"/>
-              </a:rPr>
-              <a:t>Information Sciences</a:t>
-            </a:r>
             <a:endParaRPr dirty="0"/>
           </a:p>
         </p:txBody>
@@ -5720,7 +5895,7 @@
 </file>
 
 <file path=ppt/slideLayouts/slideLayout8.xml><?xml version="1.0" encoding="utf-8"?>
-<p:sldLayout xmlns:a="http://schemas.openxmlformats.org/drawingml/2006/main" xmlns:r="http://schemas.openxmlformats.org/officeDocument/2006/relationships" xmlns:p="http://schemas.openxmlformats.org/presentationml/2006/main" matchingName="Title and Vertical Text" type="vertTx">
+<p:sldLayout xmlns:a="http://schemas.openxmlformats.org/drawingml/2006/main" xmlns:r="http://schemas.openxmlformats.org/officeDocument/2006/relationships" xmlns:p="http://schemas.openxmlformats.org/presentationml/2006/main" matchingName="Title and Vertical Text" userDrawn="1">
   <p:cSld name="VERTICAL_TEXT">
     <p:bg>
       <p:bgPr>
@@ -5751,7 +5926,13 @@
       </p:grpSpPr>
       <p:sp>
         <p:nvSpPr>
-          <p:cNvPr id="104" name="Google Shape;104;p24"/>
+          <p:cNvPr id="2" name="Google Shape;72;p18">
+            <a:extLst>
+              <a:ext uri="{FF2B5EF4-FFF2-40B4-BE49-F238E27FC236}">
+                <a16:creationId xmlns:a16="http://schemas.microsoft.com/office/drawing/2014/main" id="{1406D628-58F9-30CC-58C5-C280C01A7C25}"/>
+              </a:ext>
+            </a:extLst>
+          </p:cNvPr>
           <p:cNvSpPr txBox="1">
             <a:spLocks noGrp="1"/>
           </p:cNvSpPr>
@@ -5761,294 +5942,52 @@
         </p:nvSpPr>
         <p:spPr>
           <a:xfrm>
-            <a:off x="457200" y="590550"/>
-            <a:ext cx="8229600" cy="742950"/>
+            <a:off x="1941059" y="116458"/>
+            <a:ext cx="5031288" cy="1024165"/>
           </a:xfrm>
           <a:prstGeom prst="rect">
             <a:avLst/>
           </a:prstGeom>
-          <a:noFill/>
+          <a:solidFill>
+            <a:srgbClr val="005395"/>
+          </a:solidFill>
           <a:ln>
             <a:noFill/>
           </a:ln>
+          <a:effectLst>
+            <a:outerShdw blurRad="242888" dist="219075" dir="5400000" algn="bl" rotWithShape="0">
+              <a:srgbClr val="000000">
+                <a:alpha val="50000"/>
+              </a:srgbClr>
+            </a:outerShdw>
+          </a:effectLst>
         </p:spPr>
         <p:txBody>
-          <a:bodyPr spcFirstLastPara="1" wrap="square" lIns="91425" tIns="45700" rIns="91425" bIns="45700" anchor="ctr" anchorCtr="0">
+          <a:bodyPr spcFirstLastPara="1" wrap="square" lIns="91425" tIns="91425" rIns="91425" bIns="91425" anchor="t" anchorCtr="0">
             <a:noAutofit/>
           </a:bodyPr>
           <a:lstStyle>
-            <a:lvl1pPr lvl="0" algn="ctr">
-              <a:spcBef>
-                <a:spcPts val="0"/>
-              </a:spcBef>
-              <a:spcAft>
-                <a:spcPts val="0"/>
-              </a:spcAft>
-              <a:buSzPts val="1400"/>
-              <a:buNone/>
-              <a:defRPr>
-                <a:solidFill>
-                  <a:srgbClr val="006096"/>
-                </a:solidFill>
+            <a:lvl1pPr>
+              <a:defRPr sz="1800" b="1">
+                <a:sym typeface="Arial"/>
               </a:defRPr>
             </a:lvl1pPr>
-            <a:lvl2pPr lvl="1" algn="ctr">
-              <a:spcBef>
-                <a:spcPts val="0"/>
-              </a:spcBef>
-              <a:spcAft>
-                <a:spcPts val="0"/>
-              </a:spcAft>
-              <a:buSzPts val="1400"/>
-              <a:buNone/>
-              <a:defRPr/>
-            </a:lvl2pPr>
-            <a:lvl3pPr lvl="2" algn="ctr">
-              <a:spcBef>
-                <a:spcPts val="0"/>
-              </a:spcBef>
-              <a:spcAft>
-                <a:spcPts val="0"/>
-              </a:spcAft>
-              <a:buSzPts val="1400"/>
-              <a:buNone/>
-              <a:defRPr/>
-            </a:lvl3pPr>
-            <a:lvl4pPr lvl="3" algn="ctr">
-              <a:spcBef>
-                <a:spcPts val="0"/>
-              </a:spcBef>
-              <a:spcAft>
-                <a:spcPts val="0"/>
-              </a:spcAft>
-              <a:buSzPts val="1400"/>
-              <a:buNone/>
-              <a:defRPr/>
-            </a:lvl4pPr>
-            <a:lvl5pPr lvl="4" algn="ctr">
-              <a:spcBef>
-                <a:spcPts val="0"/>
-              </a:spcBef>
-              <a:spcAft>
-                <a:spcPts val="0"/>
-              </a:spcAft>
-              <a:buSzPts val="1400"/>
-              <a:buNone/>
-              <a:defRPr/>
-            </a:lvl5pPr>
-            <a:lvl6pPr lvl="5" algn="ctr">
-              <a:spcBef>
-                <a:spcPts val="0"/>
-              </a:spcBef>
-              <a:spcAft>
-                <a:spcPts val="0"/>
-              </a:spcAft>
-              <a:buSzPts val="1400"/>
-              <a:buNone/>
-              <a:defRPr/>
-            </a:lvl6pPr>
-            <a:lvl7pPr lvl="6" algn="ctr">
-              <a:spcBef>
-                <a:spcPts val="0"/>
-              </a:spcBef>
-              <a:spcAft>
-                <a:spcPts val="0"/>
-              </a:spcAft>
-              <a:buSzPts val="1400"/>
-              <a:buNone/>
-              <a:defRPr/>
-            </a:lvl7pPr>
-            <a:lvl8pPr lvl="7" algn="ctr">
-              <a:spcBef>
-                <a:spcPts val="0"/>
-              </a:spcBef>
-              <a:spcAft>
-                <a:spcPts val="0"/>
-              </a:spcAft>
-              <a:buSzPts val="1400"/>
-              <a:buNone/>
-              <a:defRPr/>
-            </a:lvl8pPr>
-            <a:lvl9pPr lvl="8" algn="ctr">
-              <a:spcBef>
-                <a:spcPts val="0"/>
-              </a:spcBef>
-              <a:spcAft>
-                <a:spcPts val="0"/>
-              </a:spcAft>
-              <a:buSzPts val="1400"/>
-              <a:buNone/>
-              <a:defRPr/>
-            </a:lvl9pPr>
           </a:lstStyle>
           <a:p>
-            <a:endParaRPr/>
+            <a:pPr marL="0" lvl="0" indent="0"/>
+            <a:endParaRPr dirty="0"/>
           </a:p>
         </p:txBody>
       </p:sp>
       <p:sp>
         <p:nvSpPr>
-          <p:cNvPr id="105" name="Google Shape;105;p24"/>
-          <p:cNvSpPr txBox="1">
-            <a:spLocks noGrp="1"/>
-          </p:cNvSpPr>
-          <p:nvPr>
-            <p:ph type="body" idx="1"/>
-          </p:nvPr>
-        </p:nvSpPr>
-        <p:spPr>
-          <a:xfrm rot="5400000">
-            <a:off x="3246438" y="-1169987"/>
-            <a:ext cx="2651125" cy="8229600"/>
-          </a:xfrm>
-          <a:prstGeom prst="rect">
-            <a:avLst/>
-          </a:prstGeom>
-          <a:noFill/>
-          <a:ln>
-            <a:noFill/>
-          </a:ln>
-        </p:spPr>
-        <p:txBody>
-          <a:bodyPr spcFirstLastPara="1" wrap="square" lIns="91425" tIns="45700" rIns="91425" bIns="45700" anchor="t" anchorCtr="0">
-            <a:noAutofit/>
-          </a:bodyPr>
-          <a:lstStyle>
-            <a:lvl1pPr marL="457200" lvl="0" indent="-342900" algn="l">
-              <a:spcBef>
-                <a:spcPts val="360"/>
-              </a:spcBef>
-              <a:spcAft>
-                <a:spcPts val="0"/>
-              </a:spcAft>
-              <a:buClr>
-                <a:schemeClr val="lt1"/>
-              </a:buClr>
-              <a:buSzPts val="1800"/>
-              <a:buChar char="•"/>
-              <a:defRPr/>
-            </a:lvl1pPr>
-            <a:lvl2pPr marL="914400" lvl="1" indent="-342900" algn="l">
-              <a:spcBef>
-                <a:spcPts val="360"/>
-              </a:spcBef>
-              <a:spcAft>
-                <a:spcPts val="0"/>
-              </a:spcAft>
-              <a:buClr>
-                <a:schemeClr val="lt1"/>
-              </a:buClr>
-              <a:buSzPts val="1800"/>
-              <a:buChar char="–"/>
-              <a:defRPr/>
-            </a:lvl2pPr>
-            <a:lvl3pPr marL="1371600" lvl="2" indent="-342900" algn="l">
-              <a:spcBef>
-                <a:spcPts val="360"/>
-              </a:spcBef>
-              <a:spcAft>
-                <a:spcPts val="0"/>
-              </a:spcAft>
-              <a:buClr>
-                <a:schemeClr val="lt1"/>
-              </a:buClr>
-              <a:buSzPts val="1800"/>
-              <a:buChar char="•"/>
-              <a:defRPr/>
-            </a:lvl3pPr>
-            <a:lvl4pPr marL="1828800" lvl="3" indent="-342900" algn="l">
-              <a:spcBef>
-                <a:spcPts val="360"/>
-              </a:spcBef>
-              <a:spcAft>
-                <a:spcPts val="0"/>
-              </a:spcAft>
-              <a:buClr>
-                <a:schemeClr val="lt1"/>
-              </a:buClr>
-              <a:buSzPts val="1800"/>
-              <a:buChar char="–"/>
-              <a:defRPr/>
-            </a:lvl4pPr>
-            <a:lvl5pPr marL="2286000" lvl="4" indent="-342900" algn="l">
-              <a:spcBef>
-                <a:spcPts val="360"/>
-              </a:spcBef>
-              <a:spcAft>
-                <a:spcPts val="0"/>
-              </a:spcAft>
-              <a:buClr>
-                <a:schemeClr val="lt1"/>
-              </a:buClr>
-              <a:buSzPts val="1800"/>
-              <a:buChar char="»"/>
-              <a:defRPr/>
-            </a:lvl5pPr>
-            <a:lvl6pPr marL="2743200" lvl="5" indent="-342900" algn="l">
-              <a:spcBef>
-                <a:spcPts val="360"/>
-              </a:spcBef>
-              <a:spcAft>
-                <a:spcPts val="0"/>
-              </a:spcAft>
-              <a:buClr>
-                <a:schemeClr val="dk1"/>
-              </a:buClr>
-              <a:buSzPts val="1800"/>
-              <a:buChar char="•"/>
-              <a:defRPr/>
-            </a:lvl6pPr>
-            <a:lvl7pPr marL="3200400" lvl="6" indent="-342900" algn="l">
-              <a:spcBef>
-                <a:spcPts val="360"/>
-              </a:spcBef>
-              <a:spcAft>
-                <a:spcPts val="0"/>
-              </a:spcAft>
-              <a:buClr>
-                <a:schemeClr val="dk1"/>
-              </a:buClr>
-              <a:buSzPts val="1800"/>
-              <a:buChar char="•"/>
-              <a:defRPr/>
-            </a:lvl7pPr>
-            <a:lvl8pPr marL="3657600" lvl="7" indent="-342900" algn="l">
-              <a:spcBef>
-                <a:spcPts val="360"/>
-              </a:spcBef>
-              <a:spcAft>
-                <a:spcPts val="0"/>
-              </a:spcAft>
-              <a:buClr>
-                <a:schemeClr val="dk1"/>
-              </a:buClr>
-              <a:buSzPts val="1800"/>
-              <a:buChar char="•"/>
-              <a:defRPr/>
-            </a:lvl8pPr>
-            <a:lvl9pPr marL="4114800" lvl="8" indent="-342900" algn="l">
-              <a:spcBef>
-                <a:spcPts val="360"/>
-              </a:spcBef>
-              <a:spcAft>
-                <a:spcPts val="0"/>
-              </a:spcAft>
-              <a:buClr>
-                <a:schemeClr val="dk1"/>
-              </a:buClr>
-              <a:buSzPts val="1800"/>
-              <a:buChar char="•"/>
-              <a:defRPr/>
-            </a:lvl9pPr>
-          </a:lstStyle>
-          <a:p>
-            <a:endParaRPr/>
-          </a:p>
-        </p:txBody>
-      </p:sp>
-      <p:sp>
-        <p:nvSpPr>
-          <p:cNvPr id="106" name="Google Shape;106;p24"/>
+          <p:cNvPr id="3" name="Google Shape;75;p18">
+            <a:extLst>
+              <a:ext uri="{FF2B5EF4-FFF2-40B4-BE49-F238E27FC236}">
+                <a16:creationId xmlns:a16="http://schemas.microsoft.com/office/drawing/2014/main" id="{8EDD191A-E8F7-3AD1-E1A4-230DEF879BBC}"/>
+              </a:ext>
+            </a:extLst>
+          </p:cNvPr>
           <p:cNvSpPr txBox="1">
             <a:spLocks noGrp="1"/>
           </p:cNvSpPr>
@@ -6257,9 +6196,15 @@
       </p:sp>
       <p:sp>
         <p:nvSpPr>
-          <p:cNvPr id="107" name="Google Shape;107;p24"/>
+          <p:cNvPr id="4" name="Google Shape;76;p18">
+            <a:extLst>
+              <a:ext uri="{FF2B5EF4-FFF2-40B4-BE49-F238E27FC236}">
+                <a16:creationId xmlns:a16="http://schemas.microsoft.com/office/drawing/2014/main" id="{2F6A9CDD-8E7C-E214-6F11-512EED9EF9A5}"/>
+              </a:ext>
+            </a:extLst>
+          </p:cNvPr>
           <p:cNvSpPr txBox="1"/>
-          <p:nvPr/>
+          <p:nvPr userDrawn="1"/>
         </p:nvSpPr>
         <p:spPr>
           <a:xfrm>
@@ -6290,7 +6235,7 @@
               <a:buNone/>
             </a:pPr>
             <a:r>
-              <a:rPr lang="en" sz="1400">
+              <a:rPr lang="en" sz="1400" dirty="0">
                 <a:solidFill>
                   <a:schemeClr val="lt1"/>
                 </a:solidFill>
@@ -6301,7 +6246,7 @@
               </a:rPr>
               <a:t>Greg Silber and Cory Bart</a:t>
             </a:r>
-            <a:endParaRPr/>
+            <a:endParaRPr dirty="0"/>
           </a:p>
           <a:p>
             <a:pPr marL="0" marR="0" lvl="0" indent="0" algn="l" rtl="0">
@@ -6314,7 +6259,7 @@
               <a:buNone/>
             </a:pPr>
             <a:r>
-              <a:rPr lang="en" sz="1400">
+              <a:rPr lang="en" sz="1400" dirty="0">
                 <a:solidFill>
                   <a:schemeClr val="lt1"/>
                 </a:solidFill>
@@ -6326,7 +6271,7 @@
               <a:t>Department of Computer and </a:t>
             </a:r>
             <a:br>
-              <a:rPr lang="en" sz="1400">
+              <a:rPr lang="en" sz="1400" dirty="0">
                 <a:solidFill>
                   <a:schemeClr val="lt1"/>
                 </a:solidFill>
@@ -6337,7 +6282,7 @@
               </a:rPr>
             </a:br>
             <a:r>
-              <a:rPr lang="en" sz="1400">
+              <a:rPr lang="en" sz="1400" dirty="0">
                 <a:solidFill>
                   <a:schemeClr val="lt1"/>
                 </a:solidFill>
@@ -6348,7 +6293,357 @@
               </a:rPr>
               <a:t>Information Sciences</a:t>
             </a:r>
-            <a:endParaRPr/>
+            <a:endParaRPr dirty="0"/>
+          </a:p>
+        </p:txBody>
+      </p:sp>
+      <p:sp>
+        <p:nvSpPr>
+          <p:cNvPr id="5" name="Google Shape;73;p18">
+            <a:extLst>
+              <a:ext uri="{FF2B5EF4-FFF2-40B4-BE49-F238E27FC236}">
+                <a16:creationId xmlns:a16="http://schemas.microsoft.com/office/drawing/2014/main" id="{AE6EF070-D3AF-FF02-DBE1-E7948754B92B}"/>
+              </a:ext>
+            </a:extLst>
+          </p:cNvPr>
+          <p:cNvSpPr txBox="1">
+            <a:spLocks noGrp="1"/>
+          </p:cNvSpPr>
+          <p:nvPr>
+            <p:ph type="body" idx="13"/>
+          </p:nvPr>
+        </p:nvSpPr>
+        <p:spPr>
+          <a:xfrm>
+            <a:off x="1941059" y="539884"/>
+            <a:ext cx="5044258" cy="600739"/>
+          </a:xfrm>
+          <a:prstGeom prst="rect">
+            <a:avLst/>
+          </a:prstGeom>
+          <a:noFill/>
+          <a:ln>
+            <a:noFill/>
+          </a:ln>
+        </p:spPr>
+        <p:txBody>
+          <a:bodyPr spcFirstLastPara="1" wrap="square" lIns="91425" tIns="45700" rIns="91425" bIns="45700" anchor="t" anchorCtr="0">
+            <a:noAutofit/>
+          </a:bodyPr>
+          <a:lstStyle>
+            <a:lvl1pPr marL="50800" lvl="0" indent="0" algn="l">
+              <a:spcBef>
+                <a:spcPts val="560"/>
+              </a:spcBef>
+              <a:spcAft>
+                <a:spcPts val="0"/>
+              </a:spcAft>
+              <a:buClr>
+                <a:srgbClr val="006096"/>
+              </a:buClr>
+              <a:buSzPts val="2800"/>
+              <a:buFont typeface="Arial" panose="020B0604020202020204" pitchFamily="34" charset="0"/>
+              <a:buNone/>
+              <a:defRPr lang="en-US" sz="1200" b="0" i="0" u="none" strike="noStrike" cap="none" dirty="0" smtClean="0">
+                <a:solidFill>
+                  <a:schemeClr val="bg1"/>
+                </a:solidFill>
+                <a:latin typeface="Calibri"/>
+                <a:ea typeface="Calibri"/>
+                <a:cs typeface="Calibri"/>
+                <a:sym typeface="Calibri"/>
+              </a:defRPr>
+            </a:lvl1pPr>
+            <a:lvl2pPr marL="914400" lvl="1" indent="-381000" algn="l">
+              <a:spcBef>
+                <a:spcPts val="480"/>
+              </a:spcBef>
+              <a:spcAft>
+                <a:spcPts val="0"/>
+              </a:spcAft>
+              <a:buClr>
+                <a:schemeClr val="lt1"/>
+              </a:buClr>
+              <a:buSzPts val="2400"/>
+              <a:buChar char="–"/>
+              <a:defRPr sz="2400"/>
+            </a:lvl2pPr>
+            <a:lvl3pPr marL="1371600" lvl="2" indent="-355600" algn="l">
+              <a:spcBef>
+                <a:spcPts val="400"/>
+              </a:spcBef>
+              <a:spcAft>
+                <a:spcPts val="0"/>
+              </a:spcAft>
+              <a:buClr>
+                <a:schemeClr val="lt1"/>
+              </a:buClr>
+              <a:buSzPts val="2000"/>
+              <a:buChar char="•"/>
+              <a:defRPr sz="2000"/>
+            </a:lvl3pPr>
+            <a:lvl4pPr marL="1828800" lvl="3" indent="-342900" algn="l">
+              <a:spcBef>
+                <a:spcPts val="360"/>
+              </a:spcBef>
+              <a:spcAft>
+                <a:spcPts val="0"/>
+              </a:spcAft>
+              <a:buClr>
+                <a:schemeClr val="lt1"/>
+              </a:buClr>
+              <a:buSzPts val="1800"/>
+              <a:buChar char="–"/>
+              <a:defRPr sz="1800"/>
+            </a:lvl4pPr>
+            <a:lvl5pPr marL="2286000" lvl="4" indent="-342900" algn="l">
+              <a:spcBef>
+                <a:spcPts val="360"/>
+              </a:spcBef>
+              <a:spcAft>
+                <a:spcPts val="0"/>
+              </a:spcAft>
+              <a:buClr>
+                <a:schemeClr val="lt1"/>
+              </a:buClr>
+              <a:buSzPts val="1800"/>
+              <a:buChar char="»"/>
+              <a:defRPr sz="1800"/>
+            </a:lvl5pPr>
+            <a:lvl6pPr marL="2743200" lvl="5" indent="-342900" algn="l">
+              <a:spcBef>
+                <a:spcPts val="360"/>
+              </a:spcBef>
+              <a:spcAft>
+                <a:spcPts val="0"/>
+              </a:spcAft>
+              <a:buClr>
+                <a:schemeClr val="dk1"/>
+              </a:buClr>
+              <a:buSzPts val="1800"/>
+              <a:buChar char="•"/>
+              <a:defRPr sz="1800"/>
+            </a:lvl6pPr>
+            <a:lvl7pPr marL="3200400" lvl="6" indent="-342900" algn="l">
+              <a:spcBef>
+                <a:spcPts val="360"/>
+              </a:spcBef>
+              <a:spcAft>
+                <a:spcPts val="0"/>
+              </a:spcAft>
+              <a:buClr>
+                <a:schemeClr val="dk1"/>
+              </a:buClr>
+              <a:buSzPts val="1800"/>
+              <a:buChar char="•"/>
+              <a:defRPr sz="1800"/>
+            </a:lvl7pPr>
+            <a:lvl8pPr marL="3657600" lvl="7" indent="-342900" algn="l">
+              <a:spcBef>
+                <a:spcPts val="360"/>
+              </a:spcBef>
+              <a:spcAft>
+                <a:spcPts val="0"/>
+              </a:spcAft>
+              <a:buClr>
+                <a:schemeClr val="dk1"/>
+              </a:buClr>
+              <a:buSzPts val="1800"/>
+              <a:buChar char="•"/>
+              <a:defRPr sz="1800"/>
+            </a:lvl8pPr>
+            <a:lvl9pPr marL="4114800" lvl="8" indent="-342900" algn="l">
+              <a:spcBef>
+                <a:spcPts val="360"/>
+              </a:spcBef>
+              <a:spcAft>
+                <a:spcPts val="0"/>
+              </a:spcAft>
+              <a:buClr>
+                <a:schemeClr val="dk1"/>
+              </a:buClr>
+              <a:buSzPts val="1800"/>
+              <a:buChar char="•"/>
+              <a:defRPr sz="1800"/>
+            </a:lvl9pPr>
+          </a:lstStyle>
+          <a:p>
+            <a:endParaRPr lang="en-US" dirty="0"/>
+          </a:p>
+        </p:txBody>
+      </p:sp>
+      <p:sp>
+        <p:nvSpPr>
+          <p:cNvPr id="6" name="Google Shape;73;p18">
+            <a:extLst>
+              <a:ext uri="{FF2B5EF4-FFF2-40B4-BE49-F238E27FC236}">
+                <a16:creationId xmlns:a16="http://schemas.microsoft.com/office/drawing/2014/main" id="{FAF98BD4-910B-1299-75EE-2D28C6A8FA31}"/>
+              </a:ext>
+            </a:extLst>
+          </p:cNvPr>
+          <p:cNvSpPr txBox="1">
+            <a:spLocks noGrp="1"/>
+          </p:cNvSpPr>
+          <p:nvPr>
+            <p:ph type="body" idx="1"/>
+          </p:nvPr>
+        </p:nvSpPr>
+        <p:spPr>
+          <a:xfrm>
+            <a:off x="544749" y="1295399"/>
+            <a:ext cx="8054502" cy="3181350"/>
+          </a:xfrm>
+          <a:prstGeom prst="rect">
+            <a:avLst/>
+          </a:prstGeom>
+          <a:noFill/>
+          <a:ln>
+            <a:noFill/>
+          </a:ln>
+        </p:spPr>
+        <p:txBody>
+          <a:bodyPr spcFirstLastPara="1" wrap="square" lIns="91425" tIns="45700" rIns="91425" bIns="45700" anchor="t" anchorCtr="0">
+            <a:noAutofit/>
+          </a:bodyPr>
+          <a:lstStyle>
+            <a:lvl1pPr marL="336550" lvl="0" indent="-285750" algn="l">
+              <a:spcBef>
+                <a:spcPts val="560"/>
+              </a:spcBef>
+              <a:spcAft>
+                <a:spcPts val="0"/>
+              </a:spcAft>
+              <a:buClr>
+                <a:srgbClr val="006096"/>
+              </a:buClr>
+              <a:buSzPts val="2800"/>
+              <a:buFont typeface="Arial" panose="020B0604020202020204" pitchFamily="34" charset="0"/>
+              <a:buChar char="•"/>
+              <a:defRPr lang="en-US" sz="1600" b="0" i="0" u="none" strike="noStrike" cap="none" dirty="0" smtClean="0">
+                <a:solidFill>
+                  <a:schemeClr val="bg2"/>
+                </a:solidFill>
+                <a:latin typeface="Calibri"/>
+                <a:ea typeface="Calibri"/>
+                <a:cs typeface="Calibri"/>
+                <a:sym typeface="Calibri"/>
+              </a:defRPr>
+            </a:lvl1pPr>
+            <a:lvl2pPr marL="914400" lvl="1" indent="-381000" algn="l">
+              <a:spcBef>
+                <a:spcPts val="480"/>
+              </a:spcBef>
+              <a:spcAft>
+                <a:spcPts val="0"/>
+              </a:spcAft>
+              <a:buClr>
+                <a:schemeClr val="lt1"/>
+              </a:buClr>
+              <a:buSzPts val="2400"/>
+              <a:buChar char="–"/>
+              <a:defRPr sz="2400"/>
+            </a:lvl2pPr>
+            <a:lvl3pPr marL="1371600" lvl="2" indent="-355600" algn="l">
+              <a:spcBef>
+                <a:spcPts val="400"/>
+              </a:spcBef>
+              <a:spcAft>
+                <a:spcPts val="0"/>
+              </a:spcAft>
+              <a:buClr>
+                <a:schemeClr val="lt1"/>
+              </a:buClr>
+              <a:buSzPts val="2000"/>
+              <a:buChar char="•"/>
+              <a:defRPr sz="2000"/>
+            </a:lvl3pPr>
+            <a:lvl4pPr marL="1828800" lvl="3" indent="-342900" algn="l">
+              <a:spcBef>
+                <a:spcPts val="360"/>
+              </a:spcBef>
+              <a:spcAft>
+                <a:spcPts val="0"/>
+              </a:spcAft>
+              <a:buClr>
+                <a:schemeClr val="lt1"/>
+              </a:buClr>
+              <a:buSzPts val="1800"/>
+              <a:buChar char="–"/>
+              <a:defRPr sz="1800"/>
+            </a:lvl4pPr>
+            <a:lvl5pPr marL="2286000" lvl="4" indent="-342900" algn="l">
+              <a:spcBef>
+                <a:spcPts val="360"/>
+              </a:spcBef>
+              <a:spcAft>
+                <a:spcPts val="0"/>
+              </a:spcAft>
+              <a:buClr>
+                <a:schemeClr val="lt1"/>
+              </a:buClr>
+              <a:buSzPts val="1800"/>
+              <a:buChar char="»"/>
+              <a:defRPr sz="1800"/>
+            </a:lvl5pPr>
+            <a:lvl6pPr marL="2743200" lvl="5" indent="-342900" algn="l">
+              <a:spcBef>
+                <a:spcPts val="360"/>
+              </a:spcBef>
+              <a:spcAft>
+                <a:spcPts val="0"/>
+              </a:spcAft>
+              <a:buClr>
+                <a:schemeClr val="dk1"/>
+              </a:buClr>
+              <a:buSzPts val="1800"/>
+              <a:buChar char="•"/>
+              <a:defRPr sz="1800"/>
+            </a:lvl6pPr>
+            <a:lvl7pPr marL="3200400" lvl="6" indent="-342900" algn="l">
+              <a:spcBef>
+                <a:spcPts val="360"/>
+              </a:spcBef>
+              <a:spcAft>
+                <a:spcPts val="0"/>
+              </a:spcAft>
+              <a:buClr>
+                <a:schemeClr val="dk1"/>
+              </a:buClr>
+              <a:buSzPts val="1800"/>
+              <a:buChar char="•"/>
+              <a:defRPr sz="1800"/>
+            </a:lvl7pPr>
+            <a:lvl8pPr marL="3657600" lvl="7" indent="-342900" algn="l">
+              <a:spcBef>
+                <a:spcPts val="360"/>
+              </a:spcBef>
+              <a:spcAft>
+                <a:spcPts val="0"/>
+              </a:spcAft>
+              <a:buClr>
+                <a:schemeClr val="dk1"/>
+              </a:buClr>
+              <a:buSzPts val="1800"/>
+              <a:buChar char="•"/>
+              <a:defRPr sz="1800"/>
+            </a:lvl8pPr>
+            <a:lvl9pPr marL="4114800" lvl="8" indent="-342900" algn="l">
+              <a:spcBef>
+                <a:spcPts val="360"/>
+              </a:spcBef>
+              <a:spcAft>
+                <a:spcPts val="0"/>
+              </a:spcAft>
+              <a:buClr>
+                <a:schemeClr val="dk1"/>
+              </a:buClr>
+              <a:buSzPts val="1800"/>
+              <a:buChar char="•"/>
+              <a:defRPr sz="1800"/>
+            </a:lvl9pPr>
+          </a:lstStyle>
+          <a:p>
+            <a:endParaRPr lang="en-US" dirty="0"/>
           </a:p>
         </p:txBody>
       </p:sp>

</xml_diff>

<commit_message>
Combine slides into units
</commit_message>
<xml_diff>
--- a/slides/template-silber.pptx
+++ b/slides/template-silber.pptx
@@ -1871,7 +1871,7 @@
               <a:buNone/>
               <a:defRPr sz="3200" b="1" cap="none">
                 <a:solidFill>
-                  <a:srgbClr val="00B0F0"/>
+                  <a:schemeClr val="bg1"/>
                 </a:solidFill>
               </a:defRPr>
             </a:lvl1pPr>
@@ -1965,7 +1965,7 @@
             </a:lvl9pPr>
           </a:lstStyle>
           <a:p>
-            <a:endParaRPr/>
+            <a:endParaRPr dirty="0"/>
           </a:p>
         </p:txBody>
       </p:sp>
@@ -2009,7 +2009,7 @@
               </a:buClr>
               <a:buSzPts val="2000"/>
               <a:buNone/>
-              <a:defRPr sz="2000">
+              <a:defRPr sz="4000">
                 <a:solidFill>
                   <a:srgbClr val="888888"/>
                 </a:solidFill>
@@ -2161,7 +2161,7 @@
             </a:lvl9pPr>
           </a:lstStyle>
           <a:p>
-            <a:endParaRPr/>
+            <a:endParaRPr dirty="0"/>
           </a:p>
         </p:txBody>
       </p:sp>
@@ -2542,7 +2542,7 @@
           </a:effectLst>
         </p:spPr>
         <p:txBody>
-          <a:bodyPr spcFirstLastPara="1" wrap="square" lIns="91425" tIns="91425" rIns="91425" bIns="91425" anchor="t" anchorCtr="0">
+          <a:bodyPr spcFirstLastPara="1" wrap="square" lIns="91425" tIns="0" rIns="91425" bIns="91425" anchor="t" anchorCtr="0">
             <a:noAutofit/>
           </a:bodyPr>
           <a:lstStyle>
@@ -2882,8 +2882,8 @@
         </p:nvSpPr>
         <p:spPr>
           <a:xfrm>
-            <a:off x="1941059" y="539884"/>
-            <a:ext cx="5044258" cy="600739"/>
+            <a:off x="1941059" y="341086"/>
+            <a:ext cx="5044258" cy="799537"/>
           </a:xfrm>
           <a:prstGeom prst="rect">
             <a:avLst/>
@@ -2894,7 +2894,7 @@
           </a:ln>
         </p:spPr>
         <p:txBody>
-          <a:bodyPr spcFirstLastPara="1" wrap="square" lIns="91425" tIns="45700" rIns="91425" bIns="45700" anchor="t" anchorCtr="0">
+          <a:bodyPr spcFirstLastPara="1" wrap="square" lIns="91425" tIns="0" rIns="91425" bIns="45700" anchor="t" anchorCtr="0">
             <a:noAutofit/>
           </a:bodyPr>
           <a:lstStyle>
@@ -5963,7 +5963,7 @@
           </a:effectLst>
         </p:spPr>
         <p:txBody>
-          <a:bodyPr spcFirstLastPara="1" wrap="square" lIns="91425" tIns="91425" rIns="91425" bIns="91425" anchor="t" anchorCtr="0">
+          <a:bodyPr spcFirstLastPara="1" wrap="square" lIns="91425" tIns="0" rIns="91425" bIns="91425" anchor="t" anchorCtr="0">
             <a:noAutofit/>
           </a:bodyPr>
           <a:lstStyle>
@@ -6315,8 +6315,8 @@
         </p:nvSpPr>
         <p:spPr>
           <a:xfrm>
-            <a:off x="1941059" y="539884"/>
-            <a:ext cx="5044258" cy="600739"/>
+            <a:off x="1941059" y="338328"/>
+            <a:ext cx="5044258" cy="792280"/>
           </a:xfrm>
           <a:prstGeom prst="rect">
             <a:avLst/>
@@ -6327,7 +6327,7 @@
           </a:ln>
         </p:spPr>
         <p:txBody>
-          <a:bodyPr spcFirstLastPara="1" wrap="square" lIns="91425" tIns="45700" rIns="91425" bIns="45700" anchor="t" anchorCtr="0">
+          <a:bodyPr spcFirstLastPara="1" wrap="square" lIns="91425" tIns="0" rIns="91425" bIns="0" anchor="t" anchorCtr="0">
             <a:noAutofit/>
           </a:bodyPr>
           <a:lstStyle>

</xml_diff>